<commit_message>
SC-279: set style rule SA1000
</commit_message>
<xml_diff>
--- a/ShapeCrawler.Tests/Resource/001.pptx
+++ b/ShapeCrawler.Tests/Resource/001.pptx
@@ -201,7 +201,7 @@
           <a:p>
             <a:fld id="{12586301-C795-4E70-B468-514DB1C1B146}" type="datetimeFigureOut">
               <a:rPr lang="en-US" smtClean="0"/>
-              <a:t>2/6/2022</a:t>
+              <a:t>9/20/2022</a:t>
             </a:fld>
             <a:endParaRPr lang="en-US"/>
           </a:p>
@@ -704,7 +704,7 @@
           <a:p>
             <a:fld id="{6A2D1428-0459-4F75-829F-043936AE8C9E}" type="datetimeFigureOut">
               <a:rPr lang="en-US" smtClean="0"/>
-              <a:t>2/6/2022</a:t>
+              <a:t>9/20/2022</a:t>
             </a:fld>
             <a:endParaRPr lang="en-US"/>
           </a:p>
@@ -1000,7 +1000,7 @@
           <a:p>
             <a:fld id="{6A2D1428-0459-4F75-829F-043936AE8C9E}" type="datetimeFigureOut">
               <a:rPr lang="en-US" smtClean="0"/>
-              <a:t>2/6/2022</a:t>
+              <a:t>9/20/2022</a:t>
             </a:fld>
             <a:endParaRPr lang="en-US"/>
           </a:p>
@@ -1210,7 +1210,7 @@
           <a:p>
             <a:fld id="{6A2D1428-0459-4F75-829F-043936AE8C9E}" type="datetimeFigureOut">
               <a:rPr lang="en-US" smtClean="0"/>
-              <a:t>2/6/2022</a:t>
+              <a:t>9/20/2022</a:t>
             </a:fld>
             <a:endParaRPr lang="en-US"/>
           </a:p>
@@ -1410,7 +1410,7 @@
           <a:p>
             <a:fld id="{6A2D1428-0459-4F75-829F-043936AE8C9E}" type="datetimeFigureOut">
               <a:rPr lang="en-US" smtClean="0"/>
-              <a:t>2/6/2022</a:t>
+              <a:t>9/20/2022</a:t>
             </a:fld>
             <a:endParaRPr lang="en-US"/>
           </a:p>
@@ -1686,7 +1686,7 @@
           <a:p>
             <a:fld id="{6A2D1428-0459-4F75-829F-043936AE8C9E}" type="datetimeFigureOut">
               <a:rPr lang="en-US" smtClean="0"/>
-              <a:t>2/6/2022</a:t>
+              <a:t>9/20/2022</a:t>
             </a:fld>
             <a:endParaRPr lang="en-US"/>
           </a:p>
@@ -1954,7 +1954,7 @@
           <a:p>
             <a:fld id="{6A2D1428-0459-4F75-829F-043936AE8C9E}" type="datetimeFigureOut">
               <a:rPr lang="en-US" smtClean="0"/>
-              <a:t>2/6/2022</a:t>
+              <a:t>9/20/2022</a:t>
             </a:fld>
             <a:endParaRPr lang="en-US"/>
           </a:p>
@@ -2369,7 +2369,7 @@
           <a:p>
             <a:fld id="{6A2D1428-0459-4F75-829F-043936AE8C9E}" type="datetimeFigureOut">
               <a:rPr lang="en-US" smtClean="0"/>
-              <a:t>2/6/2022</a:t>
+              <a:t>9/20/2022</a:t>
             </a:fld>
             <a:endParaRPr lang="en-US"/>
           </a:p>
@@ -2511,7 +2511,7 @@
           <a:p>
             <a:fld id="{6A2D1428-0459-4F75-829F-043936AE8C9E}" type="datetimeFigureOut">
               <a:rPr lang="en-US" smtClean="0"/>
-              <a:t>2/6/2022</a:t>
+              <a:t>9/20/2022</a:t>
             </a:fld>
             <a:endParaRPr lang="en-US"/>
           </a:p>
@@ -2624,7 +2624,7 @@
           <a:p>
             <a:fld id="{6A2D1428-0459-4F75-829F-043936AE8C9E}" type="datetimeFigureOut">
               <a:rPr lang="en-US" smtClean="0"/>
-              <a:t>2/6/2022</a:t>
+              <a:t>9/20/2022</a:t>
             </a:fld>
             <a:endParaRPr lang="en-US"/>
           </a:p>
@@ -2937,7 +2937,7 @@
           <a:p>
             <a:fld id="{6A2D1428-0459-4F75-829F-043936AE8C9E}" type="datetimeFigureOut">
               <a:rPr lang="en-US" smtClean="0"/>
-              <a:t>2/6/2022</a:t>
+              <a:t>9/20/2022</a:t>
             </a:fld>
             <a:endParaRPr lang="en-US"/>
           </a:p>
@@ -3226,7 +3226,7 @@
           <a:p>
             <a:fld id="{6A2D1428-0459-4F75-829F-043936AE8C9E}" type="datetimeFigureOut">
               <a:rPr lang="en-US" smtClean="0"/>
-              <a:t>2/6/2022</a:t>
+              <a:t>9/20/2022</a:t>
             </a:fld>
             <a:endParaRPr lang="en-US"/>
           </a:p>
@@ -3469,7 +3469,7 @@
           <a:p>
             <a:fld id="{6A2D1428-0459-4F75-829F-043936AE8C9E}" type="datetimeFigureOut">
               <a:rPr lang="en-US" smtClean="0"/>
-              <a:t>2/6/2022</a:t>
+              <a:t>9/20/2022</a:t>
             </a:fld>
             <a:endParaRPr lang="en-US"/>
           </a:p>
@@ -4190,7 +4190,7 @@
           <a:graphicData uri="http://schemas.openxmlformats.org/presentationml/2006/ole">
             <mc:AlternateContent xmlns:mc="http://schemas.openxmlformats.org/markup-compatibility/2006">
               <mc:Choice xmlns:v="urn:schemas-microsoft-com:vml" Requires="v">
-                <p:oleObj spid="_x0000_s1031" name="PDF" r:id="rId14" imgW="0" imgH="360" progId="FoxitReader.Document">
+                <p:oleObj spid="_x0000_s1032" name="PDF" r:id="rId14" imgW="0" imgH="360" progId="FoxitReader.Document">
                   <p:embed/>
                 </p:oleObj>
               </mc:Choice>
@@ -5003,7 +5003,7 @@
       </p:grpSpPr>
       <p:sp>
         <p:nvSpPr>
-          <p:cNvPr id="2" name="Заголовок 1">
+          <p:cNvPr id="2" name="Header 1">
             <a:extLst>
               <a:ext uri="{FF2B5EF4-FFF2-40B4-BE49-F238E27FC236}">
                 <a16:creationId xmlns:a16="http://schemas.microsoft.com/office/drawing/2014/main" id="{CB17EC59-2FD7-42EE-AE32-ACE28A9B3230}"/>

</xml_diff>

<commit_message>
Revert "Merge branch 'GetAllTextboxesHelper'"
This reverts commit 4642185e1c27a4d0a89cbe3db3f42020ba2fddde, reversing
changes made to e973048de18e2713976d38671e38ea0e27a7c85e.
</commit_message>
<xml_diff>
--- a/ShapeCrawler.Tests/Resource/001.pptx
+++ b/ShapeCrawler.Tests/Resource/001.pptx
@@ -201,7 +201,7 @@
           <a:p>
             <a:fld id="{12586301-C795-4E70-B468-514DB1C1B146}" type="datetimeFigureOut">
               <a:rPr lang="en-US" smtClean="0"/>
-              <a:t>9/20/2022</a:t>
+              <a:t>2/6/2022</a:t>
             </a:fld>
             <a:endParaRPr lang="en-US"/>
           </a:p>
@@ -704,7 +704,7 @@
           <a:p>
             <a:fld id="{6A2D1428-0459-4F75-829F-043936AE8C9E}" type="datetimeFigureOut">
               <a:rPr lang="en-US" smtClean="0"/>
-              <a:t>9/20/2022</a:t>
+              <a:t>2/6/2022</a:t>
             </a:fld>
             <a:endParaRPr lang="en-US"/>
           </a:p>
@@ -1000,7 +1000,7 @@
           <a:p>
             <a:fld id="{6A2D1428-0459-4F75-829F-043936AE8C9E}" type="datetimeFigureOut">
               <a:rPr lang="en-US" smtClean="0"/>
-              <a:t>9/20/2022</a:t>
+              <a:t>2/6/2022</a:t>
             </a:fld>
             <a:endParaRPr lang="en-US"/>
           </a:p>
@@ -1210,7 +1210,7 @@
           <a:p>
             <a:fld id="{6A2D1428-0459-4F75-829F-043936AE8C9E}" type="datetimeFigureOut">
               <a:rPr lang="en-US" smtClean="0"/>
-              <a:t>9/20/2022</a:t>
+              <a:t>2/6/2022</a:t>
             </a:fld>
             <a:endParaRPr lang="en-US"/>
           </a:p>
@@ -1410,7 +1410,7 @@
           <a:p>
             <a:fld id="{6A2D1428-0459-4F75-829F-043936AE8C9E}" type="datetimeFigureOut">
               <a:rPr lang="en-US" smtClean="0"/>
-              <a:t>9/20/2022</a:t>
+              <a:t>2/6/2022</a:t>
             </a:fld>
             <a:endParaRPr lang="en-US"/>
           </a:p>
@@ -1686,7 +1686,7 @@
           <a:p>
             <a:fld id="{6A2D1428-0459-4F75-829F-043936AE8C9E}" type="datetimeFigureOut">
               <a:rPr lang="en-US" smtClean="0"/>
-              <a:t>9/20/2022</a:t>
+              <a:t>2/6/2022</a:t>
             </a:fld>
             <a:endParaRPr lang="en-US"/>
           </a:p>
@@ -1954,7 +1954,7 @@
           <a:p>
             <a:fld id="{6A2D1428-0459-4F75-829F-043936AE8C9E}" type="datetimeFigureOut">
               <a:rPr lang="en-US" smtClean="0"/>
-              <a:t>9/20/2022</a:t>
+              <a:t>2/6/2022</a:t>
             </a:fld>
             <a:endParaRPr lang="en-US"/>
           </a:p>
@@ -2369,7 +2369,7 @@
           <a:p>
             <a:fld id="{6A2D1428-0459-4F75-829F-043936AE8C9E}" type="datetimeFigureOut">
               <a:rPr lang="en-US" smtClean="0"/>
-              <a:t>9/20/2022</a:t>
+              <a:t>2/6/2022</a:t>
             </a:fld>
             <a:endParaRPr lang="en-US"/>
           </a:p>
@@ -2511,7 +2511,7 @@
           <a:p>
             <a:fld id="{6A2D1428-0459-4F75-829F-043936AE8C9E}" type="datetimeFigureOut">
               <a:rPr lang="en-US" smtClean="0"/>
-              <a:t>9/20/2022</a:t>
+              <a:t>2/6/2022</a:t>
             </a:fld>
             <a:endParaRPr lang="en-US"/>
           </a:p>
@@ -2624,7 +2624,7 @@
           <a:p>
             <a:fld id="{6A2D1428-0459-4F75-829F-043936AE8C9E}" type="datetimeFigureOut">
               <a:rPr lang="en-US" smtClean="0"/>
-              <a:t>9/20/2022</a:t>
+              <a:t>2/6/2022</a:t>
             </a:fld>
             <a:endParaRPr lang="en-US"/>
           </a:p>
@@ -2937,7 +2937,7 @@
           <a:p>
             <a:fld id="{6A2D1428-0459-4F75-829F-043936AE8C9E}" type="datetimeFigureOut">
               <a:rPr lang="en-US" smtClean="0"/>
-              <a:t>9/20/2022</a:t>
+              <a:t>2/6/2022</a:t>
             </a:fld>
             <a:endParaRPr lang="en-US"/>
           </a:p>
@@ -3226,7 +3226,7 @@
           <a:p>
             <a:fld id="{6A2D1428-0459-4F75-829F-043936AE8C9E}" type="datetimeFigureOut">
               <a:rPr lang="en-US" smtClean="0"/>
-              <a:t>9/20/2022</a:t>
+              <a:t>2/6/2022</a:t>
             </a:fld>
             <a:endParaRPr lang="en-US"/>
           </a:p>
@@ -3469,7 +3469,7 @@
           <a:p>
             <a:fld id="{6A2D1428-0459-4F75-829F-043936AE8C9E}" type="datetimeFigureOut">
               <a:rPr lang="en-US" smtClean="0"/>
-              <a:t>9/20/2022</a:t>
+              <a:t>2/6/2022</a:t>
             </a:fld>
             <a:endParaRPr lang="en-US"/>
           </a:p>
@@ -4190,7 +4190,7 @@
           <a:graphicData uri="http://schemas.openxmlformats.org/presentationml/2006/ole">
             <mc:AlternateContent xmlns:mc="http://schemas.openxmlformats.org/markup-compatibility/2006">
               <mc:Choice xmlns:v="urn:schemas-microsoft-com:vml" Requires="v">
-                <p:oleObj spid="_x0000_s1032" name="PDF" r:id="rId14" imgW="0" imgH="360" progId="FoxitReader.Document">
+                <p:oleObj spid="_x0000_s1031" name="PDF" r:id="rId14" imgW="0" imgH="360" progId="FoxitReader.Document">
                   <p:embed/>
                 </p:oleObj>
               </mc:Choice>
@@ -5003,7 +5003,7 @@
       </p:grpSpPr>
       <p:sp>
         <p:nvSpPr>
-          <p:cNvPr id="2" name="Header 1">
+          <p:cNvPr id="2" name="Заголовок 1">
             <a:extLst>
               <a:ext uri="{FF2B5EF4-FFF2-40B4-BE49-F238E27FC236}">
                 <a16:creationId xmlns:a16="http://schemas.microsoft.com/office/drawing/2014/main" id="{CB17EC59-2FD7-42EE-AE32-ACE28A9B3230}"/>

</xml_diff>